<commit_message>
updated presentation with code examples
</commit_message>
<xml_diff>
--- a/Presentación/Hackaton.pptx
+++ b/Presentación/Hackaton.pptx
@@ -12,7 +12,9 @@
     <p:sldId id="260" r:id="rId6"/>
     <p:sldId id="261" r:id="rId7"/>
     <p:sldId id="262" r:id="rId8"/>
-    <p:sldId id="263" r:id="rId9"/>
+    <p:sldId id="265" r:id="rId9"/>
+    <p:sldId id="264" r:id="rId10"/>
+    <p:sldId id="263" r:id="rId11"/>
   </p:sldIdLst>
   <p:sldSz cx="9144000" cy="6858000" type="screen4x3"/>
   <p:notesSz cx="6858000" cy="9144000"/>
@@ -3158,7 +3160,11 @@
           <a:p>
             <a:r>
               <a:rPr lang="en-US" dirty="0" smtClean="0"/>
-              <a:t>Company news visualizer</a:t>
+              <a:t>Company </a:t>
+            </a:r>
+            <a:r>
+              <a:rPr lang="en-US" smtClean="0"/>
+              <a:t>News Visualizer</a:t>
             </a:r>
             <a:endParaRPr lang="en-US" dirty="0"/>
           </a:p>
@@ -3204,6 +3210,434 @@
   <p:clrMapOvr>
     <a:masterClrMapping/>
   </p:clrMapOvr>
+  <p:timing>
+    <p:tnLst>
+      <p:par>
+        <p:cTn id="1" dur="indefinite" restart="never" nodeType="tmRoot"/>
+      </p:par>
+    </p:tnLst>
+  </p:timing>
+</p:sld>
+</file>
+
+<file path=ppt/slides/slide10.xml><?xml version="1.0" encoding="utf-8"?>
+<p:sld xmlns:a="http://schemas.openxmlformats.org/drawingml/2006/main" xmlns:r="http://schemas.openxmlformats.org/officeDocument/2006/relationships" xmlns:p="http://schemas.openxmlformats.org/presentationml/2006/main">
+  <p:cSld>
+    <p:spTree>
+      <p:nvGrpSpPr>
+        <p:cNvPr id="1" name=""/>
+        <p:cNvGrpSpPr/>
+        <p:nvPr/>
+      </p:nvGrpSpPr>
+      <p:grpSpPr>
+        <a:xfrm>
+          <a:off x="0" y="0"/>
+          <a:ext cx="0" cy="0"/>
+          <a:chOff x="0" y="0"/>
+          <a:chExt cx="0" cy="0"/>
+        </a:xfrm>
+      </p:grpSpPr>
+      <p:sp>
+        <p:nvSpPr>
+          <p:cNvPr id="2" name="Title 1"/>
+          <p:cNvSpPr>
+            <a:spLocks noGrp="1"/>
+          </p:cNvSpPr>
+          <p:nvPr>
+            <p:ph type="title"/>
+          </p:nvPr>
+        </p:nvSpPr>
+        <p:spPr>
+          <a:xfrm>
+            <a:off x="380082" y="2695730"/>
+            <a:ext cx="8229600" cy="1143000"/>
+          </a:xfrm>
+        </p:spPr>
+        <p:txBody>
+          <a:bodyPr>
+            <a:normAutofit/>
+          </a:bodyPr>
+          <a:lstStyle/>
+          <a:p>
+            <a:r>
+              <a:rPr lang="en-US" dirty="0" err="1" smtClean="0"/>
+              <a:t>Referencias</a:t>
+            </a:r>
+            <a:endParaRPr lang="en-US" dirty="0"/>
+          </a:p>
+        </p:txBody>
+      </p:sp>
+      <p:sp>
+        <p:nvSpPr>
+          <p:cNvPr id="3" name="Content Placeholder 2"/>
+          <p:cNvSpPr>
+            <a:spLocks noGrp="1"/>
+          </p:cNvSpPr>
+          <p:nvPr>
+            <p:ph idx="1"/>
+          </p:nvPr>
+        </p:nvSpPr>
+        <p:spPr>
+          <a:xfrm>
+            <a:off x="457200" y="1398494"/>
+            <a:ext cx="8229600" cy="1451472"/>
+          </a:xfrm>
+        </p:spPr>
+        <p:txBody>
+          <a:bodyPr/>
+          <a:lstStyle/>
+          <a:p>
+            <a:r>
+              <a:rPr lang="en-US" dirty="0" smtClean="0"/>
+              <a:t>Open </a:t>
+            </a:r>
+            <a:r>
+              <a:rPr lang="en-US" dirty="0" smtClean="0"/>
+              <a:t>Source</a:t>
+            </a:r>
+          </a:p>
+          <a:p>
+            <a:r>
+              <a:rPr lang="es-ES" dirty="0" smtClean="0"/>
+              <a:t>Mejoras varias</a:t>
+            </a:r>
+            <a:endParaRPr lang="en-US" dirty="0" smtClean="0"/>
+          </a:p>
+          <a:p>
+            <a:endParaRPr lang="en-US" dirty="0"/>
+          </a:p>
+        </p:txBody>
+      </p:sp>
+      <p:sp>
+        <p:nvSpPr>
+          <p:cNvPr id="4" name="Title 1"/>
+          <p:cNvSpPr txBox="1">
+            <a:spLocks/>
+          </p:cNvSpPr>
+          <p:nvPr/>
+        </p:nvSpPr>
+        <p:spPr>
+          <a:xfrm>
+            <a:off x="609600" y="427038"/>
+            <a:ext cx="8229600" cy="1143000"/>
+          </a:xfrm>
+          <a:prstGeom prst="rect">
+            <a:avLst/>
+          </a:prstGeom>
+        </p:spPr>
+        <p:txBody>
+          <a:bodyPr vert="horz" lIns="91440" tIns="45720" rIns="91440" bIns="45720" rtlCol="0" anchor="ctr">
+            <a:normAutofit/>
+          </a:bodyPr>
+          <a:lstStyle>
+            <a:lvl1pPr algn="ctr" defTabSz="457200" rtl="0" eaLnBrk="1" latinLnBrk="0" hangingPunct="1">
+              <a:spcBef>
+                <a:spcPct val="0"/>
+              </a:spcBef>
+              <a:buNone/>
+              <a:defRPr sz="4400" kern="1200">
+                <a:solidFill>
+                  <a:schemeClr val="tx1"/>
+                </a:solidFill>
+                <a:latin typeface="+mj-lt"/>
+                <a:ea typeface="+mj-ea"/>
+                <a:cs typeface="+mj-cs"/>
+              </a:defRPr>
+            </a:lvl1pPr>
+          </a:lstStyle>
+          <a:p>
+            <a:r>
+              <a:rPr lang="en-US" smtClean="0"/>
+              <a:t>Futuro</a:t>
+            </a:r>
+            <a:endParaRPr lang="en-US" dirty="0"/>
+          </a:p>
+        </p:txBody>
+      </p:sp>
+      <p:sp>
+        <p:nvSpPr>
+          <p:cNvPr id="5" name="Content Placeholder 2"/>
+          <p:cNvSpPr txBox="1">
+            <a:spLocks/>
+          </p:cNvSpPr>
+          <p:nvPr/>
+        </p:nvSpPr>
+        <p:spPr>
+          <a:xfrm>
+            <a:off x="457200" y="3838730"/>
+            <a:ext cx="8229600" cy="2639188"/>
+          </a:xfrm>
+          <a:prstGeom prst="rect">
+            <a:avLst/>
+          </a:prstGeom>
+        </p:spPr>
+        <p:txBody>
+          <a:bodyPr vert="horz" lIns="91440" tIns="45720" rIns="91440" bIns="45720" rtlCol="0">
+            <a:normAutofit fontScale="92500" lnSpcReduction="20000"/>
+          </a:bodyPr>
+          <a:lstStyle>
+            <a:lvl1pPr marL="342900" indent="-342900" algn="l" defTabSz="457200" rtl="0" eaLnBrk="1" latinLnBrk="0" hangingPunct="1">
+              <a:spcBef>
+                <a:spcPct val="20000"/>
+              </a:spcBef>
+              <a:buFont typeface="Arial"/>
+              <a:buChar char="•"/>
+              <a:defRPr sz="3200" kern="1200">
+                <a:solidFill>
+                  <a:schemeClr val="tx1"/>
+                </a:solidFill>
+                <a:latin typeface="+mn-lt"/>
+                <a:ea typeface="+mn-ea"/>
+                <a:cs typeface="+mn-cs"/>
+              </a:defRPr>
+            </a:lvl1pPr>
+            <a:lvl2pPr marL="742950" indent="-285750" algn="l" defTabSz="457200" rtl="0" eaLnBrk="1" latinLnBrk="0" hangingPunct="1">
+              <a:spcBef>
+                <a:spcPct val="20000"/>
+              </a:spcBef>
+              <a:buFont typeface="Arial"/>
+              <a:buChar char="–"/>
+              <a:defRPr sz="2800" kern="1200">
+                <a:solidFill>
+                  <a:schemeClr val="tx1"/>
+                </a:solidFill>
+                <a:latin typeface="+mn-lt"/>
+                <a:ea typeface="+mn-ea"/>
+                <a:cs typeface="+mn-cs"/>
+              </a:defRPr>
+            </a:lvl2pPr>
+            <a:lvl3pPr marL="1143000" indent="-228600" algn="l" defTabSz="457200" rtl="0" eaLnBrk="1" latinLnBrk="0" hangingPunct="1">
+              <a:spcBef>
+                <a:spcPct val="20000"/>
+              </a:spcBef>
+              <a:buFont typeface="Arial"/>
+              <a:buChar char="•"/>
+              <a:defRPr sz="2400" kern="1200">
+                <a:solidFill>
+                  <a:schemeClr val="tx1"/>
+                </a:solidFill>
+                <a:latin typeface="+mn-lt"/>
+                <a:ea typeface="+mn-ea"/>
+                <a:cs typeface="+mn-cs"/>
+              </a:defRPr>
+            </a:lvl3pPr>
+            <a:lvl4pPr marL="1600200" indent="-228600" algn="l" defTabSz="457200" rtl="0" eaLnBrk="1" latinLnBrk="0" hangingPunct="1">
+              <a:spcBef>
+                <a:spcPct val="20000"/>
+              </a:spcBef>
+              <a:buFont typeface="Arial"/>
+              <a:buChar char="–"/>
+              <a:defRPr sz="2000" kern="1200">
+                <a:solidFill>
+                  <a:schemeClr val="tx1"/>
+                </a:solidFill>
+                <a:latin typeface="+mn-lt"/>
+                <a:ea typeface="+mn-ea"/>
+                <a:cs typeface="+mn-cs"/>
+              </a:defRPr>
+            </a:lvl4pPr>
+            <a:lvl5pPr marL="2057400" indent="-228600" algn="l" defTabSz="457200" rtl="0" eaLnBrk="1" latinLnBrk="0" hangingPunct="1">
+              <a:spcBef>
+                <a:spcPct val="20000"/>
+              </a:spcBef>
+              <a:buFont typeface="Arial"/>
+              <a:buChar char="»"/>
+              <a:defRPr sz="2000" kern="1200">
+                <a:solidFill>
+                  <a:schemeClr val="tx1"/>
+                </a:solidFill>
+                <a:latin typeface="+mn-lt"/>
+                <a:ea typeface="+mn-ea"/>
+                <a:cs typeface="+mn-cs"/>
+              </a:defRPr>
+            </a:lvl5pPr>
+            <a:lvl6pPr marL="2514600" indent="-228600" algn="l" defTabSz="457200" rtl="0" eaLnBrk="1" latinLnBrk="0" hangingPunct="1">
+              <a:spcBef>
+                <a:spcPct val="20000"/>
+              </a:spcBef>
+              <a:buFont typeface="Arial"/>
+              <a:buChar char="•"/>
+              <a:defRPr sz="2000" kern="1200">
+                <a:solidFill>
+                  <a:schemeClr val="tx1"/>
+                </a:solidFill>
+                <a:latin typeface="+mn-lt"/>
+                <a:ea typeface="+mn-ea"/>
+                <a:cs typeface="+mn-cs"/>
+              </a:defRPr>
+            </a:lvl6pPr>
+            <a:lvl7pPr marL="2971800" indent="-228600" algn="l" defTabSz="457200" rtl="0" eaLnBrk="1" latinLnBrk="0" hangingPunct="1">
+              <a:spcBef>
+                <a:spcPct val="20000"/>
+              </a:spcBef>
+              <a:buFont typeface="Arial"/>
+              <a:buChar char="•"/>
+              <a:defRPr sz="2000" kern="1200">
+                <a:solidFill>
+                  <a:schemeClr val="tx1"/>
+                </a:solidFill>
+                <a:latin typeface="+mn-lt"/>
+                <a:ea typeface="+mn-ea"/>
+                <a:cs typeface="+mn-cs"/>
+              </a:defRPr>
+            </a:lvl7pPr>
+            <a:lvl8pPr marL="3429000" indent="-228600" algn="l" defTabSz="457200" rtl="0" eaLnBrk="1" latinLnBrk="0" hangingPunct="1">
+              <a:spcBef>
+                <a:spcPct val="20000"/>
+              </a:spcBef>
+              <a:buFont typeface="Arial"/>
+              <a:buChar char="•"/>
+              <a:defRPr sz="2000" kern="1200">
+                <a:solidFill>
+                  <a:schemeClr val="tx1"/>
+                </a:solidFill>
+                <a:latin typeface="+mn-lt"/>
+                <a:ea typeface="+mn-ea"/>
+                <a:cs typeface="+mn-cs"/>
+              </a:defRPr>
+            </a:lvl8pPr>
+            <a:lvl9pPr marL="3886200" indent="-228600" algn="l" defTabSz="457200" rtl="0" eaLnBrk="1" latinLnBrk="0" hangingPunct="1">
+              <a:spcBef>
+                <a:spcPct val="20000"/>
+              </a:spcBef>
+              <a:buFont typeface="Arial"/>
+              <a:buChar char="•"/>
+              <a:defRPr sz="2000" kern="1200">
+                <a:solidFill>
+                  <a:schemeClr val="tx1"/>
+                </a:solidFill>
+                <a:latin typeface="+mn-lt"/>
+                <a:ea typeface="+mn-ea"/>
+                <a:cs typeface="+mn-cs"/>
+              </a:defRPr>
+            </a:lvl9pPr>
+          </a:lstStyle>
+          <a:p>
+            <a:r>
+              <a:rPr lang="en-US" dirty="0" err="1" smtClean="0"/>
+              <a:t>nodejs</a:t>
+            </a:r>
+            <a:r>
+              <a:rPr lang="en-US" dirty="0"/>
+              <a:t> </a:t>
+            </a:r>
+            <a:r>
+              <a:rPr lang="en-US" dirty="0" smtClean="0"/>
+              <a:t/>
+            </a:r>
+            <a:br>
+              <a:rPr lang="en-US" dirty="0" smtClean="0"/>
+            </a:br>
+            <a:r>
+              <a:rPr lang="en-US" dirty="0" smtClean="0">
+                <a:hlinkClick r:id="rId2"/>
+              </a:rPr>
+              <a:t>https</a:t>
+            </a:r>
+            <a:r>
+              <a:rPr lang="en-US" dirty="0">
+                <a:hlinkClick r:id="rId2"/>
+              </a:rPr>
+              <a:t>://nodejs.org</a:t>
+            </a:r>
+            <a:r>
+              <a:rPr lang="en-US" dirty="0" smtClean="0">
+                <a:hlinkClick r:id="rId2"/>
+              </a:rPr>
+              <a:t>/</a:t>
+            </a:r>
+            <a:endParaRPr lang="en-US" dirty="0" smtClean="0"/>
+          </a:p>
+          <a:p>
+            <a:r>
+              <a:rPr lang="es-ES" dirty="0" err="1" smtClean="0"/>
+              <a:t>json</a:t>
+            </a:r>
+            <a:r>
+              <a:rPr lang="es-ES" dirty="0"/>
+              <a:t>-server </a:t>
+            </a:r>
+            <a:r>
+              <a:rPr lang="es-ES" dirty="0" smtClean="0"/>
+              <a:t/>
+            </a:r>
+            <a:br>
+              <a:rPr lang="es-ES" dirty="0" smtClean="0"/>
+            </a:br>
+            <a:r>
+              <a:rPr lang="es-ES" dirty="0" smtClean="0">
+                <a:hlinkClick r:id="rId3"/>
+              </a:rPr>
+              <a:t>https</a:t>
+            </a:r>
+            <a:r>
+              <a:rPr lang="es-ES" dirty="0">
+                <a:hlinkClick r:id="rId3"/>
+              </a:rPr>
+              <a:t>://</a:t>
+            </a:r>
+            <a:r>
+              <a:rPr lang="es-ES" dirty="0" smtClean="0">
+                <a:hlinkClick r:id="rId3"/>
+              </a:rPr>
+              <a:t>github.com/typicode/json-server</a:t>
+            </a:r>
+            <a:endParaRPr lang="es-ES" dirty="0" smtClean="0"/>
+          </a:p>
+          <a:p>
+            <a:r>
+              <a:rPr lang="es-ES" dirty="0" err="1" smtClean="0"/>
+              <a:t>Handlebars</a:t>
+            </a:r>
+            <a:r>
+              <a:rPr lang="es-ES" dirty="0"/>
+              <a:t/>
+            </a:r>
+            <a:br>
+              <a:rPr lang="es-ES" dirty="0"/>
+            </a:br>
+            <a:r>
+              <a:rPr lang="es-ES" dirty="0">
+                <a:hlinkClick r:id="rId4"/>
+              </a:rPr>
+              <a:t>http://handlebarsjs.com</a:t>
+            </a:r>
+            <a:r>
+              <a:rPr lang="es-ES" dirty="0" smtClean="0">
+                <a:hlinkClick r:id="rId4"/>
+              </a:rPr>
+              <a:t>/</a:t>
+            </a:r>
+            <a:endParaRPr lang="es-ES" dirty="0"/>
+          </a:p>
+          <a:p>
+            <a:endParaRPr lang="es-ES" dirty="0" smtClean="0"/>
+          </a:p>
+          <a:p>
+            <a:endParaRPr lang="en-US" dirty="0" smtClean="0"/>
+          </a:p>
+          <a:p>
+            <a:endParaRPr lang="en-US" dirty="0"/>
+          </a:p>
+        </p:txBody>
+      </p:sp>
+    </p:spTree>
+    <p:extLst>
+      <p:ext uri="{BB962C8B-B14F-4D97-AF65-F5344CB8AC3E}">
+        <p14:creationId xmlns:p14="http://schemas.microsoft.com/office/powerpoint/2010/main" val="2485251190"/>
+      </p:ext>
+    </p:extLst>
+  </p:cSld>
+  <p:clrMapOvr>
+    <a:masterClrMapping/>
+  </p:clrMapOvr>
+  <p:timing>
+    <p:tnLst>
+      <p:par>
+        <p:cTn id="1" dur="indefinite" restart="never" nodeType="tmRoot"/>
+      </p:par>
+    </p:tnLst>
+  </p:timing>
 </p:sld>
 </file>
 
@@ -3388,7 +3822,6 @@
               <a:rPr lang="en-US" dirty="0" smtClean="0"/>
               <a:t> las personas.</a:t>
             </a:r>
-            <a:endParaRPr lang="en-US" dirty="0" smtClean="0"/>
           </a:p>
           <a:p>
             <a:r>
@@ -3502,6 +3935,13 @@
   <p:clrMapOvr>
     <a:masterClrMapping/>
   </p:clrMapOvr>
+  <p:timing>
+    <p:tnLst>
+      <p:par>
+        <p:cTn id="1" dur="indefinite" restart="never" nodeType="tmRoot"/>
+      </p:par>
+    </p:tnLst>
+  </p:timing>
 </p:sld>
 </file>
 
@@ -3828,6 +4268,13 @@
   <p:clrMapOvr>
     <a:masterClrMapping/>
   </p:clrMapOvr>
+  <p:timing>
+    <p:tnLst>
+      <p:par>
+        <p:cTn id="1" dur="indefinite" restart="never" nodeType="tmRoot"/>
+      </p:par>
+    </p:tnLst>
+  </p:timing>
 </p:sld>
 </file>
 
@@ -3913,13 +4360,8 @@
             </a:r>
             <a:r>
               <a:rPr lang="en-US" dirty="0" smtClean="0"/>
-              <a:t> </a:t>
-            </a:r>
-            <a:r>
-              <a:rPr lang="en-US" dirty="0" smtClean="0"/>
-              <a:t>personal</a:t>
-            </a:r>
-            <a:endParaRPr lang="en-US" dirty="0" smtClean="0"/>
+              <a:t> personal</a:t>
+            </a:r>
           </a:p>
           <a:p>
             <a:r>
@@ -3944,13 +4386,8 @@
             </a:r>
             <a:r>
               <a:rPr lang="en-US" dirty="0" smtClean="0"/>
-              <a:t> </a:t>
-            </a:r>
-            <a:r>
-              <a:rPr lang="en-US" dirty="0" smtClean="0"/>
-              <a:t>real</a:t>
-            </a:r>
-            <a:endParaRPr lang="en-US" dirty="0" smtClean="0"/>
+              <a:t> real</a:t>
+            </a:r>
           </a:p>
           <a:p>
             <a:r>
@@ -4005,7 +4442,6 @@
               <a:rPr lang="en-US" dirty="0" smtClean="0"/>
               <a:t>!</a:t>
             </a:r>
-            <a:endParaRPr lang="en-US" dirty="0" smtClean="0"/>
           </a:p>
           <a:p>
             <a:r>
@@ -4083,6 +4519,13 @@
   <p:clrMapOvr>
     <a:masterClrMapping/>
   </p:clrMapOvr>
+  <p:timing>
+    <p:tnLst>
+      <p:par>
+        <p:cTn id="1" dur="indefinite" restart="never" nodeType="tmRoot"/>
+      </p:par>
+    </p:tnLst>
+  </p:timing>
 </p:sld>
 </file>
 
@@ -4195,11 +4638,7 @@
           <a:p>
             <a:r>
               <a:rPr lang="en-US" dirty="0" smtClean="0"/>
-              <a:t>Handlebars </a:t>
-            </a:r>
-            <a:r>
-              <a:rPr lang="en-US" dirty="0" smtClean="0"/>
-              <a:t>para </a:t>
+              <a:t>Handlebars para </a:t>
             </a:r>
             <a:r>
               <a:rPr lang="en-US" dirty="0" err="1" smtClean="0"/>
@@ -4216,11 +4655,7 @@
           <a:p>
             <a:r>
               <a:rPr lang="en-US" dirty="0" smtClean="0"/>
-              <a:t>Forecast </a:t>
-            </a:r>
-            <a:r>
-              <a:rPr lang="en-US" dirty="0" smtClean="0"/>
-              <a:t>API.</a:t>
+              <a:t>Forecast API.</a:t>
             </a:r>
           </a:p>
           <a:p>
@@ -4244,6 +4679,13 @@
   <p:clrMapOvr>
     <a:masterClrMapping/>
   </p:clrMapOvr>
+  <p:timing>
+    <p:tnLst>
+      <p:par>
+        <p:cTn id="1" dur="indefinite" restart="never" nodeType="tmRoot"/>
+      </p:par>
+    </p:tnLst>
+  </p:timing>
 </p:sld>
 </file>
 
@@ -4478,6 +4920,13 @@
   <p:clrMapOvr>
     <a:masterClrMapping/>
   </p:clrMapOvr>
+  <p:timing>
+    <p:tnLst>
+      <p:par>
+        <p:cTn id="1" dur="indefinite" restart="never" nodeType="tmRoot"/>
+      </p:par>
+    </p:tnLst>
+  </p:timing>
 </p:sld>
 </file>
 
@@ -4696,6 +5145,13 @@
   <p:clrMapOvr>
     <a:masterClrMapping/>
   </p:clrMapOvr>
+  <p:timing>
+    <p:tnLst>
+      <p:par>
+        <p:cTn id="1" dur="indefinite" restart="never" nodeType="tmRoot"/>
+      </p:par>
+    </p:tnLst>
+  </p:timing>
 </p:sld>
 </file>
 
@@ -4728,54 +5184,219 @@
         </p:nvSpPr>
         <p:spPr/>
         <p:txBody>
-          <a:bodyPr>
-            <a:normAutofit/>
-          </a:bodyPr>
-          <a:lstStyle/>
-          <a:p>
-            <a:r>
-              <a:rPr lang="en-US" dirty="0" err="1" smtClean="0"/>
-              <a:t>Futuro</a:t>
+          <a:bodyPr/>
+          <a:lstStyle/>
+          <a:p>
+            <a:r>
+              <a:rPr lang="es-ES" dirty="0" err="1" smtClean="0"/>
+              <a:t>json</a:t>
+            </a:r>
+            <a:r>
+              <a:rPr lang="es-ES" dirty="0" smtClean="0"/>
+              <a:t>-server</a:t>
             </a:r>
             <a:endParaRPr lang="en-US" dirty="0"/>
           </a:p>
         </p:txBody>
       </p:sp>
-      <p:sp>
-        <p:nvSpPr>
-          <p:cNvPr id="3" name="Content Placeholder 2"/>
-          <p:cNvSpPr>
-            <a:spLocks noGrp="1"/>
-          </p:cNvSpPr>
-          <p:nvPr>
-            <p:ph idx="1"/>
-          </p:nvPr>
-        </p:nvSpPr>
-        <p:spPr/>
-        <p:txBody>
-          <a:bodyPr/>
-          <a:lstStyle/>
-          <a:p>
-            <a:r>
-              <a:rPr lang="en-US" dirty="0" smtClean="0"/>
-              <a:t>Open Source</a:t>
-            </a:r>
-          </a:p>
-          <a:p>
-            <a:endParaRPr lang="en-US" dirty="0"/>
-          </a:p>
-        </p:txBody>
-      </p:sp>
+      <p:pic>
+        <p:nvPicPr>
+          <p:cNvPr id="5" name="Picture 4"/>
+          <p:cNvPicPr>
+            <a:picLocks noChangeAspect="1"/>
+          </p:cNvPicPr>
+          <p:nvPr/>
+        </p:nvPicPr>
+        <p:blipFill rotWithShape="1">
+          <a:blip r:embed="rId2"/>
+          <a:srcRect b="28121"/>
+          <a:stretch/>
+        </p:blipFill>
+        <p:spPr>
+          <a:xfrm>
+            <a:off x="4756532" y="1417639"/>
+            <a:ext cx="3685142" cy="2471316"/>
+          </a:xfrm>
+          <a:prstGeom prst="rect">
+            <a:avLst/>
+          </a:prstGeom>
+        </p:spPr>
+      </p:pic>
+      <p:pic>
+        <p:nvPicPr>
+          <p:cNvPr id="6" name="Picture 5"/>
+          <p:cNvPicPr>
+            <a:picLocks noChangeAspect="1"/>
+          </p:cNvPicPr>
+          <p:nvPr/>
+        </p:nvPicPr>
+        <p:blipFill>
+          <a:blip r:embed="rId3"/>
+          <a:stretch>
+            <a:fillRect/>
+          </a:stretch>
+        </p:blipFill>
+        <p:spPr>
+          <a:xfrm>
+            <a:off x="2070533" y="4387503"/>
+            <a:ext cx="5002934" cy="1656490"/>
+          </a:xfrm>
+          <a:prstGeom prst="rect">
+            <a:avLst/>
+          </a:prstGeom>
+        </p:spPr>
+      </p:pic>
+      <p:pic>
+        <p:nvPicPr>
+          <p:cNvPr id="8" name="Picture 7"/>
+          <p:cNvPicPr>
+            <a:picLocks noChangeAspect="1"/>
+          </p:cNvPicPr>
+          <p:nvPr/>
+        </p:nvPicPr>
+        <p:blipFill>
+          <a:blip r:embed="rId4"/>
+          <a:stretch>
+            <a:fillRect/>
+          </a:stretch>
+        </p:blipFill>
+        <p:spPr>
+          <a:xfrm>
+            <a:off x="585787" y="1417638"/>
+            <a:ext cx="3192999" cy="2655110"/>
+          </a:xfrm>
+          <a:prstGeom prst="rect">
+            <a:avLst/>
+          </a:prstGeom>
+        </p:spPr>
+      </p:pic>
     </p:spTree>
     <p:extLst>
       <p:ext uri="{BB962C8B-B14F-4D97-AF65-F5344CB8AC3E}">
-        <p14:creationId xmlns:p14="http://schemas.microsoft.com/office/powerpoint/2010/main" val="2485251190"/>
+        <p14:creationId xmlns:p14="http://schemas.microsoft.com/office/powerpoint/2010/main" val="3383615735"/>
       </p:ext>
     </p:extLst>
   </p:cSld>
   <p:clrMapOvr>
     <a:masterClrMapping/>
   </p:clrMapOvr>
+  <p:timing>
+    <p:tnLst>
+      <p:par>
+        <p:cTn id="1" dur="indefinite" restart="never" nodeType="tmRoot"/>
+      </p:par>
+    </p:tnLst>
+  </p:timing>
+</p:sld>
+</file>
+
+<file path=ppt/slides/slide9.xml><?xml version="1.0" encoding="utf-8"?>
+<p:sld xmlns:a="http://schemas.openxmlformats.org/drawingml/2006/main" xmlns:r="http://schemas.openxmlformats.org/officeDocument/2006/relationships" xmlns:p="http://schemas.openxmlformats.org/presentationml/2006/main">
+  <p:cSld>
+    <p:spTree>
+      <p:nvGrpSpPr>
+        <p:cNvPr id="1" name=""/>
+        <p:cNvGrpSpPr/>
+        <p:nvPr/>
+      </p:nvGrpSpPr>
+      <p:grpSpPr>
+        <a:xfrm>
+          <a:off x="0" y="0"/>
+          <a:ext cx="0" cy="0"/>
+          <a:chOff x="0" y="0"/>
+          <a:chExt cx="0" cy="0"/>
+        </a:xfrm>
+      </p:grpSpPr>
+      <p:sp>
+        <p:nvSpPr>
+          <p:cNvPr id="2" name="Title 1"/>
+          <p:cNvSpPr>
+            <a:spLocks noGrp="1"/>
+          </p:cNvSpPr>
+          <p:nvPr>
+            <p:ph type="title"/>
+          </p:nvPr>
+        </p:nvSpPr>
+        <p:spPr/>
+        <p:txBody>
+          <a:bodyPr/>
+          <a:lstStyle/>
+          <a:p>
+            <a:r>
+              <a:rPr lang="es-ES" dirty="0" err="1" smtClean="0"/>
+              <a:t>Handlebars</a:t>
+            </a:r>
+            <a:endParaRPr lang="en-US" dirty="0"/>
+          </a:p>
+        </p:txBody>
+      </p:sp>
+      <p:pic>
+        <p:nvPicPr>
+          <p:cNvPr id="4" name="Content Placeholder 3"/>
+          <p:cNvPicPr>
+            <a:picLocks noGrp="1" noChangeAspect="1"/>
+          </p:cNvPicPr>
+          <p:nvPr>
+            <p:ph idx="1"/>
+          </p:nvPr>
+        </p:nvPicPr>
+        <p:blipFill>
+          <a:blip r:embed="rId2"/>
+          <a:stretch>
+            <a:fillRect/>
+          </a:stretch>
+        </p:blipFill>
+        <p:spPr>
+          <a:xfrm>
+            <a:off x="707691" y="1417638"/>
+            <a:ext cx="7728617" cy="2311008"/>
+          </a:xfrm>
+          <a:prstGeom prst="rect">
+            <a:avLst/>
+          </a:prstGeom>
+        </p:spPr>
+      </p:pic>
+      <p:pic>
+        <p:nvPicPr>
+          <p:cNvPr id="5" name="Picture 4"/>
+          <p:cNvPicPr>
+            <a:picLocks noChangeAspect="1"/>
+          </p:cNvPicPr>
+          <p:nvPr/>
+        </p:nvPicPr>
+        <p:blipFill>
+          <a:blip r:embed="rId3"/>
+          <a:stretch>
+            <a:fillRect/>
+          </a:stretch>
+        </p:blipFill>
+        <p:spPr>
+          <a:xfrm>
+            <a:off x="1714427" y="3961284"/>
+            <a:ext cx="5715143" cy="2896716"/>
+          </a:xfrm>
+          <a:prstGeom prst="rect">
+            <a:avLst/>
+          </a:prstGeom>
+        </p:spPr>
+      </p:pic>
+    </p:spTree>
+    <p:extLst>
+      <p:ext uri="{BB962C8B-B14F-4D97-AF65-F5344CB8AC3E}">
+        <p14:creationId xmlns:p14="http://schemas.microsoft.com/office/powerpoint/2010/main" val="3474281719"/>
+      </p:ext>
+    </p:extLst>
+  </p:cSld>
+  <p:clrMapOvr>
+    <a:masterClrMapping/>
+  </p:clrMapOvr>
+  <p:timing>
+    <p:tnLst>
+      <p:par>
+        <p:cTn id="1" dur="indefinite" restart="never" nodeType="tmRoot"/>
+      </p:par>
+    </p:tnLst>
+  </p:timing>
 </p:sld>
 </file>
 

</xml_diff>